<commit_message>
Small change to flow chart
</commit_message>
<xml_diff>
--- a/paper/images/pagelifecycle.pptx
+++ b/paper/images/pagelifecycle.pptx
@@ -3401,13 +3401,16 @@
       <p:cxnSp>
         <p:nvCxnSpPr>
           <p:cNvPr id="17" name="Straight Arrow Connector 16"/>
-          <p:cNvCxnSpPr/>
+          <p:cNvCxnSpPr>
+            <a:stCxn id="7" idx="3"/>
+            <a:endCxn id="8" idx="1"/>
+          </p:cNvCxnSpPr>
           <p:nvPr/>
         </p:nvCxnSpPr>
         <p:spPr>
           <a:xfrm>
-            <a:off x="7734300" y="4760415"/>
-            <a:ext cx="266700" cy="860267"/>
+            <a:off x="4419600" y="5701425"/>
+            <a:ext cx="2756106" cy="356475"/>
           </a:xfrm>
           <a:prstGeom prst="straightConnector1">
             <a:avLst/>

</xml_diff>